<commit_message>
add stock selection page and delete errorneous bower_compoents folder
</commit_message>
<xml_diff>
--- a/StockLion_PAGE OUTLOOK.pptx
+++ b/StockLion_PAGE OUTLOOK.pptx
@@ -213,7 +213,7 @@
           <a:p>
             <a:fld id="{64729A31-2305-084E-AF69-478E241E96F9}" type="datetimeFigureOut">
               <a:rPr lang="en-US" smtClean="0"/>
-              <a:t>4/18/17</a:t>
+              <a:t>4/20/17</a:t>
             </a:fld>
             <a:endParaRPr lang="en-US"/>
           </a:p>
@@ -612,7 +612,7 @@
           <a:p>
             <a:fld id="{392E3B5B-7758-FB4D-80C8-DF6030780D62}" type="datetimeFigureOut">
               <a:rPr lang="en-US" smtClean="0"/>
-              <a:t>4/18/17</a:t>
+              <a:t>4/20/17</a:t>
             </a:fld>
             <a:endParaRPr lang="en-US"/>
           </a:p>
@@ -777,7 +777,7 @@
           <a:p>
             <a:fld id="{392E3B5B-7758-FB4D-80C8-DF6030780D62}" type="datetimeFigureOut">
               <a:rPr lang="en-US" smtClean="0"/>
-              <a:t>4/18/17</a:t>
+              <a:t>4/20/17</a:t>
             </a:fld>
             <a:endParaRPr lang="en-US"/>
           </a:p>
@@ -952,7 +952,7 @@
           <a:p>
             <a:fld id="{392E3B5B-7758-FB4D-80C8-DF6030780D62}" type="datetimeFigureOut">
               <a:rPr lang="en-US" smtClean="0"/>
-              <a:t>4/18/17</a:t>
+              <a:t>4/20/17</a:t>
             </a:fld>
             <a:endParaRPr lang="en-US"/>
           </a:p>
@@ -1117,7 +1117,7 @@
           <a:p>
             <a:fld id="{392E3B5B-7758-FB4D-80C8-DF6030780D62}" type="datetimeFigureOut">
               <a:rPr lang="en-US" smtClean="0"/>
-              <a:t>4/18/17</a:t>
+              <a:t>4/20/17</a:t>
             </a:fld>
             <a:endParaRPr lang="en-US"/>
           </a:p>
@@ -1356,7 +1356,7 @@
           <a:p>
             <a:fld id="{392E3B5B-7758-FB4D-80C8-DF6030780D62}" type="datetimeFigureOut">
               <a:rPr lang="en-US" smtClean="0"/>
-              <a:t>4/18/17</a:t>
+              <a:t>4/20/17</a:t>
             </a:fld>
             <a:endParaRPr lang="en-US"/>
           </a:p>
@@ -1583,7 +1583,7 @@
           <a:p>
             <a:fld id="{392E3B5B-7758-FB4D-80C8-DF6030780D62}" type="datetimeFigureOut">
               <a:rPr lang="en-US" smtClean="0"/>
-              <a:t>4/18/17</a:t>
+              <a:t>4/20/17</a:t>
             </a:fld>
             <a:endParaRPr lang="en-US"/>
           </a:p>
@@ -1945,7 +1945,7 @@
           <a:p>
             <a:fld id="{392E3B5B-7758-FB4D-80C8-DF6030780D62}" type="datetimeFigureOut">
               <a:rPr lang="en-US" smtClean="0"/>
-              <a:t>4/18/17</a:t>
+              <a:t>4/20/17</a:t>
             </a:fld>
             <a:endParaRPr lang="en-US"/>
           </a:p>
@@ -2058,7 +2058,7 @@
           <a:p>
             <a:fld id="{392E3B5B-7758-FB4D-80C8-DF6030780D62}" type="datetimeFigureOut">
               <a:rPr lang="en-US" smtClean="0"/>
-              <a:t>4/18/17</a:t>
+              <a:t>4/20/17</a:t>
             </a:fld>
             <a:endParaRPr lang="en-US"/>
           </a:p>
@@ -2148,7 +2148,7 @@
           <a:p>
             <a:fld id="{392E3B5B-7758-FB4D-80C8-DF6030780D62}" type="datetimeFigureOut">
               <a:rPr lang="en-US" smtClean="0"/>
-              <a:t>4/18/17</a:t>
+              <a:t>4/20/17</a:t>
             </a:fld>
             <a:endParaRPr lang="en-US"/>
           </a:p>
@@ -2420,7 +2420,7 @@
           <a:p>
             <a:fld id="{392E3B5B-7758-FB4D-80C8-DF6030780D62}" type="datetimeFigureOut">
               <a:rPr lang="en-US" smtClean="0"/>
-              <a:t>4/18/17</a:t>
+              <a:t>4/20/17</a:t>
             </a:fld>
             <a:endParaRPr lang="en-US"/>
           </a:p>
@@ -2672,7 +2672,7 @@
           <a:p>
             <a:fld id="{392E3B5B-7758-FB4D-80C8-DF6030780D62}" type="datetimeFigureOut">
               <a:rPr lang="en-US" smtClean="0"/>
-              <a:t>4/18/17</a:t>
+              <a:t>4/20/17</a:t>
             </a:fld>
             <a:endParaRPr lang="en-US"/>
           </a:p>
@@ -2880,7 +2880,7 @@
           <a:p>
             <a:fld id="{392E3B5B-7758-FB4D-80C8-DF6030780D62}" type="datetimeFigureOut">
               <a:rPr lang="en-US" smtClean="0"/>
-              <a:t>4/18/17</a:t>
+              <a:t>4/20/17</a:t>
             </a:fld>
             <a:endParaRPr lang="en-US"/>
           </a:p>

</xml_diff>